<commit_message>
sections 4 and 5 slides
</commit_message>
<xml_diff>
--- a/doc/section3.pptx
+++ b/doc/section3.pptx
@@ -16474,6 +16474,13 @@
   <p:clrMapOvr>
     <a:masterClrMapping/>
   </p:clrMapOvr>
+  <p:timing>
+    <p:tnLst>
+      <p:par>
+        <p:cTn xmlns:p14="http://schemas.microsoft.com/office/powerpoint/2010/main" id="1" dur="indefinite" restart="never" nodeType="tmRoot"/>
+      </p:par>
+    </p:tnLst>
+  </p:timing>
 </p:sld>
 </file>
 
@@ -16601,6 +16608,13 @@
   <p:clrMapOvr>
     <a:masterClrMapping/>
   </p:clrMapOvr>
+  <p:timing>
+    <p:tnLst>
+      <p:par>
+        <p:cTn xmlns:p14="http://schemas.microsoft.com/office/powerpoint/2010/main" id="1" dur="indefinite" restart="never" nodeType="tmRoot"/>
+      </p:par>
+    </p:tnLst>
+  </p:timing>
 </p:sld>
 </file>
 
@@ -16661,6 +16675,13 @@
   <p:clrMapOvr>
     <a:masterClrMapping/>
   </p:clrMapOvr>
+  <p:timing>
+    <p:tnLst>
+      <p:par>
+        <p:cTn xmlns:p14="http://schemas.microsoft.com/office/powerpoint/2010/main" id="1" dur="indefinite" restart="never" nodeType="tmRoot"/>
+      </p:par>
+    </p:tnLst>
+  </p:timing>
 </p:sld>
 </file>
 
@@ -16721,6 +16742,13 @@
   <p:clrMapOvr>
     <a:masterClrMapping/>
   </p:clrMapOvr>
+  <p:timing>
+    <p:tnLst>
+      <p:par>
+        <p:cTn xmlns:p14="http://schemas.microsoft.com/office/powerpoint/2010/main" id="1" dur="indefinite" restart="never" nodeType="tmRoot"/>
+      </p:par>
+    </p:tnLst>
+  </p:timing>
 </p:sld>
 </file>
 
@@ -16793,6 +16821,13 @@
   <p:clrMapOvr>
     <a:masterClrMapping/>
   </p:clrMapOvr>
+  <p:timing>
+    <p:tnLst>
+      <p:par>
+        <p:cTn xmlns:p14="http://schemas.microsoft.com/office/powerpoint/2010/main" id="1" dur="indefinite" restart="never" nodeType="tmRoot"/>
+      </p:par>
+    </p:tnLst>
+  </p:timing>
 </p:sld>
 </file>
 
@@ -17006,6 +17041,13 @@
   <p:clrMapOvr>
     <a:masterClrMapping/>
   </p:clrMapOvr>
+  <p:timing>
+    <p:tnLst>
+      <p:par>
+        <p:cTn xmlns:p14="http://schemas.microsoft.com/office/powerpoint/2010/main" id="1" dur="indefinite" restart="never" nodeType="tmRoot"/>
+      </p:par>
+    </p:tnLst>
+  </p:timing>
 </p:sld>
 </file>
 
@@ -18407,6 +18449,13 @@
   <p:clrMapOvr>
     <a:masterClrMapping/>
   </p:clrMapOvr>
+  <p:timing>
+    <p:tnLst>
+      <p:par>
+        <p:cTn xmlns:p14="http://schemas.microsoft.com/office/powerpoint/2010/main" id="1" dur="indefinite" restart="never" nodeType="tmRoot"/>
+      </p:par>
+    </p:tnLst>
+  </p:timing>
 </p:sld>
 </file>
 
@@ -19773,7 +19822,7 @@
 </file>
 
 <file path=ppt/slides/slide3.xml><?xml version="1.0" encoding="utf-8"?>
-<p:sld xmlns:a="http://schemas.openxmlformats.org/drawingml/2006/main" xmlns:r="http://schemas.openxmlformats.org/officeDocument/2006/relationships" xmlns:p="http://schemas.openxmlformats.org/presentationml/2006/main">
+<p:sld xmlns:a="http://schemas.openxmlformats.org/drawingml/2006/main" xmlns:r="http://schemas.openxmlformats.org/officeDocument/2006/relationships" xmlns:p="http://schemas.openxmlformats.org/presentationml/2006/main" show="0">
   <p:cSld>
     <p:spTree>
       <p:nvGrpSpPr>
@@ -19915,6 +19964,21 @@
   <p:clrMapOvr>
     <a:masterClrMapping/>
   </p:clrMapOvr>
+  <mc:AlternateContent xmlns:mc="http://schemas.openxmlformats.org/markup-compatibility/2006">
+    <mc:Choice xmlns:p14="http://schemas.microsoft.com/office/powerpoint/2010/main" Requires="p14">
+      <p:transition spd="slow" p14:dur="2000"/>
+    </mc:Choice>
+    <mc:Fallback>
+      <p:transition xmlns:p14="http://schemas.microsoft.com/office/powerpoint/2010/main" spd="slow"/>
+    </mc:Fallback>
+  </mc:AlternateContent>
+  <p:timing>
+    <p:tnLst>
+      <p:par>
+        <p:cTn xmlns:p14="http://schemas.microsoft.com/office/powerpoint/2010/main" id="1" dur="indefinite" restart="never" nodeType="tmRoot"/>
+      </p:par>
+    </p:tnLst>
+  </p:timing>
 </p:sld>
 </file>
 
@@ -23238,8 +23302,19 @@
                 <a:ea typeface="宋体" charset="0"/>
                 <a:cs typeface="宋体" charset="0"/>
               </a:rPr>
-              <a:t>iterations)</a:t>
+              <a:t>iterations</a:t>
             </a:r>
+            <a:r>
+              <a:rPr lang="en-GB" altLang="zh-CN" dirty="0" smtClean="0">
+                <a:ea typeface="宋体" charset="0"/>
+                <a:cs typeface="宋体" charset="0"/>
+              </a:rPr>
+              <a:t>)</a:t>
+            </a:r>
+            <a:endParaRPr lang="en-GB" altLang="zh-CN" dirty="0">
+              <a:ea typeface="宋体" charset="0"/>
+              <a:cs typeface="宋体" charset="0"/>
+            </a:endParaRPr>
           </a:p>
           <a:p>
             <a:r>
@@ -23248,9 +23323,40 @@
             </a:r>
           </a:p>
           <a:p>
+            <a:pPr lvl="1"/>
+            <a:r>
+              <a:rPr lang="en-US" dirty="0" smtClean="0"/>
+              <a:t>O(</a:t>
+            </a:r>
+            <a:r>
+              <a:rPr lang="en-US" dirty="0" err="1" smtClean="0"/>
+              <a:t>sharding</a:t>
+            </a:r>
+            <a:r>
+              <a:rPr lang="en-US" dirty="0" smtClean="0"/>
+              <a:t>) + O(~distance metric) + O(collapsing</a:t>
+            </a:r>
+            <a:r>
+              <a:rPr lang="en-US" smtClean="0"/>
+              <a:t>) + </a:t>
+            </a:r>
+            <a:r>
+              <a:rPr lang="en-US" dirty="0" smtClean="0"/>
+              <a:t>O(assignment)</a:t>
+            </a:r>
+            <a:endParaRPr lang="en-US" dirty="0" smtClean="0"/>
+          </a:p>
+          <a:p>
             <a:r>
               <a:rPr lang="en-US" dirty="0" smtClean="0"/>
               <a:t>Canopy + K-means Complexity?</a:t>
+            </a:r>
+          </a:p>
+          <a:p>
+            <a:pPr lvl="1"/>
+            <a:r>
+              <a:rPr lang="en-US" dirty="0" smtClean="0"/>
+              <a:t>O(K-means(n, k)) + O(Canopy(n))</a:t>
             </a:r>
             <a:endParaRPr lang="en-US" dirty="0"/>
           </a:p>
@@ -23292,6 +23398,13 @@
   <p:clrMapOvr>
     <a:masterClrMapping/>
   </p:clrMapOvr>
+  <p:timing>
+    <p:tnLst>
+      <p:par>
+        <p:cTn xmlns:p14="http://schemas.microsoft.com/office/powerpoint/2010/main" id="1" dur="indefinite" restart="never" nodeType="tmRoot"/>
+      </p:par>
+    </p:tnLst>
+  </p:timing>
 </p:sld>
 </file>
 
@@ -23983,6 +24096,13 @@
   <p:clrMapOvr>
     <a:masterClrMapping/>
   </p:clrMapOvr>
+  <p:timing>
+    <p:tnLst>
+      <p:par>
+        <p:cTn xmlns:p14="http://schemas.microsoft.com/office/powerpoint/2010/main" id="1" dur="indefinite" restart="never" nodeType="tmRoot"/>
+      </p:par>
+    </p:tnLst>
+  </p:timing>
 </p:sld>
 </file>
 

</xml_diff>